<commit_message>
update webpage with no upper menu
</commit_message>
<xml_diff>
--- a/HeartRay-website .pptx
+++ b/HeartRay-website .pptx
@@ -5,7 +5,7 @@
     <p:sldMasterId id="2147483906" r:id="rId1"/>
   </p:sldMasterIdLst>
   <p:notesMasterIdLst>
-    <p:notesMasterId r:id="rId11"/>
+    <p:notesMasterId r:id="rId14"/>
   </p:notesMasterIdLst>
   <p:sldIdLst>
     <p:sldId id="257" r:id="rId2"/>
@@ -16,33 +16,32 @@
     <p:sldId id="3452" r:id="rId7"/>
     <p:sldId id="3476" r:id="rId8"/>
     <p:sldId id="3477" r:id="rId9"/>
-    <p:sldId id="3478" r:id="rId10"/>
+    <p:sldId id="3479" r:id="rId10"/>
+    <p:sldId id="3478" r:id="rId11"/>
+    <p:sldId id="3481" r:id="rId12"/>
+    <p:sldId id="3480" r:id="rId13"/>
   </p:sldIdLst>
   <p:sldSz cx="18288000" cy="10287000"/>
   <p:notesSz cx="7315200" cy="9601200"/>
   <p:embeddedFontLst>
     <p:embeddedFont>
-      <p:font typeface="Aharoni" panose="02010803020104030203" pitchFamily="2" charset="-79"/>
-      <p:bold r:id="rId12"/>
-    </p:embeddedFont>
-    <p:embeddedFont>
       <p:font typeface="Arial Black" panose="020B0A04020102020204" pitchFamily="34" charset="0"/>
-      <p:bold r:id="rId13"/>
+      <p:bold r:id="rId15"/>
     </p:embeddedFont>
     <p:embeddedFont>
       <p:font typeface="Calisto MT" panose="02040603050505030304" pitchFamily="18" charset="0"/>
-      <p:regular r:id="rId14"/>
-      <p:bold r:id="rId15"/>
-      <p:italic r:id="rId16"/>
-      <p:boldItalic r:id="rId17"/>
+      <p:regular r:id="rId16"/>
+      <p:bold r:id="rId17"/>
+      <p:italic r:id="rId18"/>
+      <p:boldItalic r:id="rId19"/>
     </p:embeddedFont>
     <p:embeddedFont>
       <p:font typeface="Open Sauce Light" panose="020B0604020202020204" charset="0"/>
-      <p:regular r:id="rId18"/>
+      <p:regular r:id="rId20"/>
     </p:embeddedFont>
     <p:embeddedFont>
       <p:font typeface="Wingdings 2" panose="05020102010507070707" pitchFamily="18" charset="2"/>
-      <p:regular r:id="rId19"/>
+      <p:regular r:id="rId21"/>
     </p:embeddedFont>
   </p:embeddedFontLst>
   <p:defaultTextStyle>
@@ -241,7 +240,7 @@
           <a:p>
             <a:fld id="{4664001C-8D19-4BEB-AA80-162DF0748FA6}" type="datetimeFigureOut">
               <a:rPr lang="en-US" smtClean="0"/>
-              <a:t>8/22/2024</a:t>
+              <a:t>11/3/2024</a:t>
             </a:fld>
             <a:endParaRPr lang="en-US"/>
           </a:p>
@@ -1096,6 +1095,114 @@
 </p:notes>
 </file>
 
+<file path=ppt/notesSlides/notesSlide8.xml><?xml version="1.0" encoding="utf-8"?>
+<p:notes xmlns:a="http://schemas.openxmlformats.org/drawingml/2006/main" xmlns:r="http://schemas.openxmlformats.org/officeDocument/2006/relationships" xmlns:p="http://schemas.openxmlformats.org/presentationml/2006/main">
+  <p:cSld>
+    <p:spTree>
+      <p:nvGrpSpPr>
+        <p:cNvPr id="1" name="">
+          <a:extLst>
+            <a:ext uri="{FF2B5EF4-FFF2-40B4-BE49-F238E27FC236}">
+              <a16:creationId xmlns:a16="http://schemas.microsoft.com/office/drawing/2014/main" id="{142FD74E-FC6D-E344-30BC-7E119B9E6EC4}"/>
+            </a:ext>
+          </a:extLst>
+        </p:cNvPr>
+        <p:cNvGrpSpPr/>
+        <p:nvPr/>
+      </p:nvGrpSpPr>
+      <p:grpSpPr>
+        <a:xfrm>
+          <a:off x="0" y="0"/>
+          <a:ext cx="0" cy="0"/>
+          <a:chOff x="0" y="0"/>
+          <a:chExt cx="0" cy="0"/>
+        </a:xfrm>
+      </p:grpSpPr>
+      <p:sp>
+        <p:nvSpPr>
+          <p:cNvPr id="2" name="Slide Image Placeholder 1">
+            <a:extLst>
+              <a:ext uri="{FF2B5EF4-FFF2-40B4-BE49-F238E27FC236}">
+                <a16:creationId xmlns:a16="http://schemas.microsoft.com/office/drawing/2014/main" id="{B4E32750-B8B7-42BE-7B5A-0B9984151110}"/>
+              </a:ext>
+            </a:extLst>
+          </p:cNvPr>
+          <p:cNvSpPr>
+            <a:spLocks noGrp="1" noRot="1" noChangeAspect="1"/>
+          </p:cNvSpPr>
+          <p:nvPr>
+            <p:ph type="sldImg"/>
+          </p:nvPr>
+        </p:nvSpPr>
+        <p:spPr/>
+      </p:sp>
+      <p:sp>
+        <p:nvSpPr>
+          <p:cNvPr id="3" name="Notes Placeholder 2">
+            <a:extLst>
+              <a:ext uri="{FF2B5EF4-FFF2-40B4-BE49-F238E27FC236}">
+                <a16:creationId xmlns:a16="http://schemas.microsoft.com/office/drawing/2014/main" id="{4911DE3C-C681-A870-6A1D-66465485EE1C}"/>
+              </a:ext>
+            </a:extLst>
+          </p:cNvPr>
+          <p:cNvSpPr>
+            <a:spLocks noGrp="1"/>
+          </p:cNvSpPr>
+          <p:nvPr>
+            <p:ph type="body" idx="1"/>
+          </p:nvPr>
+        </p:nvSpPr>
+        <p:spPr/>
+        <p:txBody>
+          <a:bodyPr/>
+          <a:lstStyle/>
+          <a:p>
+            <a:endParaRPr lang="en-US" dirty="0"/>
+          </a:p>
+        </p:txBody>
+      </p:sp>
+      <p:sp>
+        <p:nvSpPr>
+          <p:cNvPr id="4" name="Slide Number Placeholder 3">
+            <a:extLst>
+              <a:ext uri="{FF2B5EF4-FFF2-40B4-BE49-F238E27FC236}">
+                <a16:creationId xmlns:a16="http://schemas.microsoft.com/office/drawing/2014/main" id="{1B50CC50-7039-4545-82AA-56745C7346F8}"/>
+              </a:ext>
+            </a:extLst>
+          </p:cNvPr>
+          <p:cNvSpPr>
+            <a:spLocks noGrp="1"/>
+          </p:cNvSpPr>
+          <p:nvPr>
+            <p:ph type="sldNum" sz="quarter" idx="5"/>
+          </p:nvPr>
+        </p:nvSpPr>
+        <p:spPr/>
+        <p:txBody>
+          <a:bodyPr/>
+          <a:lstStyle/>
+          <a:p>
+            <a:fld id="{B149801C-0B54-4516-895A-F20D8058F1BF}" type="slidenum">
+              <a:rPr lang="en-US" smtClean="0"/>
+              <a:t>9</a:t>
+            </a:fld>
+            <a:endParaRPr lang="en-US"/>
+          </a:p>
+        </p:txBody>
+      </p:sp>
+    </p:spTree>
+    <p:extLst>
+      <p:ext uri="{BB962C8B-B14F-4D97-AF65-F5344CB8AC3E}">
+        <p14:creationId xmlns:p14="http://schemas.microsoft.com/office/powerpoint/2010/main" val="2738092159"/>
+      </p:ext>
+    </p:extLst>
+  </p:cSld>
+  <p:clrMapOvr>
+    <a:masterClrMapping/>
+  </p:clrMapOvr>
+</p:notes>
+</file>
+
 <file path=ppt/slideLayouts/slideLayout1.xml><?xml version="1.0" encoding="utf-8"?>
 <p:sldLayout xmlns:a="http://schemas.openxmlformats.org/drawingml/2006/main" xmlns:r="http://schemas.openxmlformats.org/officeDocument/2006/relationships" xmlns:p="http://schemas.openxmlformats.org/presentationml/2006/main" type="title" preserve="1">
   <p:cSld name="Title Slide">
@@ -1282,7 +1389,7 @@
             <a:fld id="{1D8BD707-D9CF-40AE-B4C6-C98DA3205C09}" type="datetimeFigureOut">
               <a:rPr lang="en-US" smtClean="0"/>
               <a:pPr/>
-              <a:t>8/22/2024</a:t>
+              <a:t>11/3/2024</a:t>
             </a:fld>
             <a:endParaRPr lang="en-US"/>
           </a:p>
@@ -1582,7 +1689,7 @@
             <a:fld id="{1D8BD707-D9CF-40AE-B4C6-C98DA3205C09}" type="datetimeFigureOut">
               <a:rPr lang="en-US" smtClean="0"/>
               <a:pPr/>
-              <a:t>8/22/2024</a:t>
+              <a:t>11/3/2024</a:t>
             </a:fld>
             <a:endParaRPr lang="en-US"/>
           </a:p>
@@ -1776,7 +1883,7 @@
             <a:fld id="{1D8BD707-D9CF-40AE-B4C6-C98DA3205C09}" type="datetimeFigureOut">
               <a:rPr lang="en-US" smtClean="0"/>
               <a:pPr/>
-              <a:t>8/22/2024</a:t>
+              <a:t>11/3/2024</a:t>
             </a:fld>
             <a:endParaRPr lang="en-US"/>
           </a:p>
@@ -2039,7 +2146,7 @@
             <a:fld id="{1D8BD707-D9CF-40AE-B4C6-C98DA3205C09}" type="datetimeFigureOut">
               <a:rPr lang="en-US" smtClean="0"/>
               <a:pPr/>
-              <a:t>8/22/2024</a:t>
+              <a:t>11/3/2024</a:t>
             </a:fld>
             <a:endParaRPr lang="en-US"/>
           </a:p>
@@ -2465,7 +2572,7 @@
             <a:fld id="{1D8BD707-D9CF-40AE-B4C6-C98DA3205C09}" type="datetimeFigureOut">
               <a:rPr lang="en-US" smtClean="0"/>
               <a:pPr/>
-              <a:t>8/22/2024</a:t>
+              <a:t>11/3/2024</a:t>
             </a:fld>
             <a:endParaRPr lang="en-US"/>
           </a:p>
@@ -3004,7 +3111,7 @@
             <a:fld id="{1D8BD707-D9CF-40AE-B4C6-C98DA3205C09}" type="datetimeFigureOut">
               <a:rPr lang="en-US" smtClean="0"/>
               <a:pPr/>
-              <a:t>8/22/2024</a:t>
+              <a:t>11/3/2024</a:t>
             </a:fld>
             <a:endParaRPr lang="en-US"/>
           </a:p>
@@ -3870,7 +3977,7 @@
             <a:fld id="{1D8BD707-D9CF-40AE-B4C6-C98DA3205C09}" type="datetimeFigureOut">
               <a:rPr lang="en-US" smtClean="0"/>
               <a:pPr/>
-              <a:t>8/22/2024</a:t>
+              <a:t>11/3/2024</a:t>
             </a:fld>
             <a:endParaRPr lang="en-US"/>
           </a:p>
@@ -4042,7 +4149,7 @@
             <a:fld id="{1D8BD707-D9CF-40AE-B4C6-C98DA3205C09}" type="datetimeFigureOut">
               <a:rPr lang="en-US" smtClean="0"/>
               <a:pPr/>
-              <a:t>8/22/2024</a:t>
+              <a:t>11/3/2024</a:t>
             </a:fld>
             <a:endParaRPr lang="en-US"/>
           </a:p>
@@ -4228,7 +4335,7 @@
             <a:fld id="{1D8BD707-D9CF-40AE-B4C6-C98DA3205C09}" type="datetimeFigureOut">
               <a:rPr lang="en-US" smtClean="0"/>
               <a:pPr/>
-              <a:t>8/22/2024</a:t>
+              <a:t>11/3/2024</a:t>
             </a:fld>
             <a:endParaRPr lang="en-US"/>
           </a:p>
@@ -4749,7 +4856,7 @@
             <a:fld id="{1D8BD707-D9CF-40AE-B4C6-C98DA3205C09}" type="datetimeFigureOut">
               <a:rPr lang="en-US" smtClean="0"/>
               <a:pPr/>
-              <a:t>8/22/2024</a:t>
+              <a:t>11/3/2024</a:t>
             </a:fld>
             <a:endParaRPr lang="en-US"/>
           </a:p>
@@ -4995,7 +5102,7 @@
             <a:fld id="{1D8BD707-D9CF-40AE-B4C6-C98DA3205C09}" type="datetimeFigureOut">
               <a:rPr lang="en-US" smtClean="0"/>
               <a:pPr/>
-              <a:t>8/22/2024</a:t>
+              <a:t>11/3/2024</a:t>
             </a:fld>
             <a:endParaRPr lang="en-US"/>
           </a:p>
@@ -5233,7 +5340,7 @@
             <a:fld id="{1D8BD707-D9CF-40AE-B4C6-C98DA3205C09}" type="datetimeFigureOut">
               <a:rPr lang="en-US" smtClean="0"/>
               <a:pPr/>
-              <a:t>8/22/2024</a:t>
+              <a:t>11/3/2024</a:t>
             </a:fld>
             <a:endParaRPr lang="en-US"/>
           </a:p>
@@ -5701,7 +5808,7 @@
             <a:fld id="{1D8BD707-D9CF-40AE-B4C6-C98DA3205C09}" type="datetimeFigureOut">
               <a:rPr lang="en-US" smtClean="0"/>
               <a:pPr/>
-              <a:t>8/22/2024</a:t>
+              <a:t>11/3/2024</a:t>
             </a:fld>
             <a:endParaRPr lang="en-US"/>
           </a:p>
@@ -5821,7 +5928,7 @@
             <a:fld id="{1D8BD707-D9CF-40AE-B4C6-C98DA3205C09}" type="datetimeFigureOut">
               <a:rPr lang="en-US" smtClean="0"/>
               <a:pPr/>
-              <a:t>8/22/2024</a:t>
+              <a:t>11/3/2024</a:t>
             </a:fld>
             <a:endParaRPr lang="en-US"/>
           </a:p>
@@ -5918,7 +6025,7 @@
             <a:fld id="{1D8BD707-D9CF-40AE-B4C6-C98DA3205C09}" type="datetimeFigureOut">
               <a:rPr lang="en-US" smtClean="0"/>
               <a:pPr/>
-              <a:t>8/22/2024</a:t>
+              <a:t>11/3/2024</a:t>
             </a:fld>
             <a:endParaRPr lang="en-US"/>
           </a:p>
@@ -6175,7 +6282,7 @@
             <a:fld id="{1D8BD707-D9CF-40AE-B4C6-C98DA3205C09}" type="datetimeFigureOut">
               <a:rPr lang="en-US" smtClean="0"/>
               <a:pPr/>
-              <a:t>8/22/2024</a:t>
+              <a:t>11/3/2024</a:t>
             </a:fld>
             <a:endParaRPr lang="en-US"/>
           </a:p>
@@ -6477,7 +6584,7 @@
             <a:fld id="{1D8BD707-D9CF-40AE-B4C6-C98DA3205C09}" type="datetimeFigureOut">
               <a:rPr lang="en-US" smtClean="0"/>
               <a:pPr/>
-              <a:t>8/22/2024</a:t>
+              <a:t>11/3/2024</a:t>
             </a:fld>
             <a:endParaRPr lang="en-US"/>
           </a:p>
@@ -6713,7 +6820,7 @@
             <a:fld id="{1D8BD707-D9CF-40AE-B4C6-C98DA3205C09}" type="datetimeFigureOut">
               <a:rPr lang="en-US" smtClean="0"/>
               <a:pPr/>
-              <a:t>8/22/2024</a:t>
+              <a:t>11/3/2024</a:t>
             </a:fld>
             <a:endParaRPr lang="en-US"/>
           </a:p>
@@ -7417,7 +7524,7 @@
         </p:blipFill>
         <p:spPr>
           <a:xfrm>
-            <a:off x="7086600" y="381595"/>
+            <a:off x="6324600" y="562034"/>
             <a:ext cx="4761905" cy="4761905"/>
           </a:xfrm>
           <a:prstGeom prst="rect">
@@ -7594,6 +7701,862 @@
         </p:txBody>
       </p:sp>
     </p:spTree>
+  </p:cSld>
+  <p:clrMapOvr>
+    <a:masterClrMapping/>
+  </p:clrMapOvr>
+</p:sld>
+</file>
+
+<file path=ppt/slides/slide10.xml><?xml version="1.0" encoding="utf-8"?>
+<p:sld xmlns:a="http://schemas.openxmlformats.org/drawingml/2006/main" xmlns:r="http://schemas.openxmlformats.org/officeDocument/2006/relationships" xmlns:p="http://schemas.openxmlformats.org/presentationml/2006/main">
+  <p:cSld>
+    <p:bg>
+      <p:bgPr>
+        <a:solidFill>
+          <a:srgbClr val="E5D6A4"/>
+        </a:solidFill>
+        <a:effectLst/>
+      </p:bgPr>
+    </p:bg>
+    <p:spTree>
+      <p:nvGrpSpPr>
+        <p:cNvPr id="1" name=""/>
+        <p:cNvGrpSpPr/>
+        <p:nvPr/>
+      </p:nvGrpSpPr>
+      <p:grpSpPr>
+        <a:xfrm>
+          <a:off x="0" y="0"/>
+          <a:ext cx="0" cy="0"/>
+          <a:chOff x="0" y="0"/>
+          <a:chExt cx="0" cy="0"/>
+        </a:xfrm>
+      </p:grpSpPr>
+      <p:grpSp>
+        <p:nvGrpSpPr>
+          <p:cNvPr id="7" name="Group 6">
+            <a:extLst>
+              <a:ext uri="{FF2B5EF4-FFF2-40B4-BE49-F238E27FC236}">
+                <a16:creationId xmlns:a16="http://schemas.microsoft.com/office/drawing/2014/main" id="{161CA642-011C-022B-62B0-5AA22758E270}"/>
+              </a:ext>
+            </a:extLst>
+          </p:cNvPr>
+          <p:cNvGrpSpPr/>
+          <p:nvPr/>
+        </p:nvGrpSpPr>
+        <p:grpSpPr>
+          <a:xfrm>
+            <a:off x="5105400" y="1333500"/>
+            <a:ext cx="6858000" cy="6248400"/>
+            <a:chOff x="4953000" y="1181100"/>
+            <a:chExt cx="6781800" cy="6477000"/>
+          </a:xfrm>
+        </p:grpSpPr>
+        <p:sp>
+          <p:nvSpPr>
+            <p:cNvPr id="2" name="Oval 1">
+              <a:extLst>
+                <a:ext uri="{FF2B5EF4-FFF2-40B4-BE49-F238E27FC236}">
+                  <a16:creationId xmlns:a16="http://schemas.microsoft.com/office/drawing/2014/main" id="{62A7F912-B268-5D40-E5B0-D07C23A434C8}"/>
+                </a:ext>
+              </a:extLst>
+            </p:cNvPr>
+            <p:cNvSpPr/>
+            <p:nvPr/>
+          </p:nvSpPr>
+          <p:spPr>
+            <a:xfrm>
+              <a:off x="6629400" y="1181100"/>
+              <a:ext cx="3657600" cy="3810000"/>
+            </a:xfrm>
+            <a:prstGeom prst="ellipse">
+              <a:avLst/>
+            </a:prstGeom>
+            <a:solidFill>
+              <a:schemeClr val="accent2">
+                <a:lumMod val="75000"/>
+              </a:schemeClr>
+            </a:solidFill>
+            <a:ln>
+              <a:noFill/>
+            </a:ln>
+          </p:spPr>
+          <p:style>
+            <a:lnRef idx="2">
+              <a:schemeClr val="accent1">
+                <a:shade val="15000"/>
+              </a:schemeClr>
+            </a:lnRef>
+            <a:fillRef idx="1">
+              <a:schemeClr val="accent1"/>
+            </a:fillRef>
+            <a:effectRef idx="0">
+              <a:schemeClr val="accent1"/>
+            </a:effectRef>
+            <a:fontRef idx="minor">
+              <a:schemeClr val="lt1"/>
+            </a:fontRef>
+          </p:style>
+          <p:txBody>
+            <a:bodyPr rtlCol="0" anchor="ctr"/>
+            <a:lstStyle/>
+            <a:p>
+              <a:pPr algn="ctr"/>
+              <a:r>
+                <a:rPr lang="en-US" sz="2400" dirty="0">
+                  <a:latin typeface="Arial Black" panose="020B0A04020102020204" pitchFamily="34" charset="0"/>
+                </a:rPr>
+                <a:t>Cutting edge </a:t>
+              </a:r>
+            </a:p>
+            <a:p>
+              <a:pPr algn="ctr"/>
+              <a:r>
+                <a:rPr lang="en-US" sz="2400" dirty="0">
+                  <a:latin typeface="Arial Black" panose="020B0A04020102020204" pitchFamily="34" charset="0"/>
+                </a:rPr>
+                <a:t>Technology</a:t>
+              </a:r>
+            </a:p>
+          </p:txBody>
+        </p:sp>
+        <p:sp>
+          <p:nvSpPr>
+            <p:cNvPr id="6" name="Oval 5">
+              <a:extLst>
+                <a:ext uri="{FF2B5EF4-FFF2-40B4-BE49-F238E27FC236}">
+                  <a16:creationId xmlns:a16="http://schemas.microsoft.com/office/drawing/2014/main" id="{BF26A61C-6C7F-4DBE-6099-8927279C9E66}"/>
+                </a:ext>
+              </a:extLst>
+            </p:cNvPr>
+            <p:cNvSpPr/>
+            <p:nvPr/>
+          </p:nvSpPr>
+          <p:spPr>
+            <a:xfrm>
+              <a:off x="8077200" y="3848100"/>
+              <a:ext cx="3657600" cy="3810000"/>
+            </a:xfrm>
+            <a:prstGeom prst="ellipse">
+              <a:avLst/>
+            </a:prstGeom>
+            <a:solidFill>
+              <a:srgbClr val="FB51D7">
+                <a:alpha val="90000"/>
+              </a:srgbClr>
+            </a:solidFill>
+            <a:ln>
+              <a:noFill/>
+            </a:ln>
+          </p:spPr>
+          <p:style>
+            <a:lnRef idx="2">
+              <a:schemeClr val="accent1">
+                <a:shade val="15000"/>
+              </a:schemeClr>
+            </a:lnRef>
+            <a:fillRef idx="1">
+              <a:schemeClr val="accent1"/>
+            </a:fillRef>
+            <a:effectRef idx="0">
+              <a:schemeClr val="accent1"/>
+            </a:effectRef>
+            <a:fontRef idx="minor">
+              <a:schemeClr val="lt1"/>
+            </a:fontRef>
+          </p:style>
+          <p:txBody>
+            <a:bodyPr rtlCol="0" anchor="ctr"/>
+            <a:lstStyle/>
+            <a:p>
+              <a:pPr algn="ctr"/>
+              <a:r>
+                <a:rPr lang="en-US" sz="2400" dirty="0">
+                  <a:latin typeface="Arial Black" panose="020B0A04020102020204" pitchFamily="34" charset="0"/>
+                </a:rPr>
+                <a:t>Various </a:t>
+              </a:r>
+            </a:p>
+            <a:p>
+              <a:pPr algn="ctr"/>
+              <a:r>
+                <a:rPr lang="en-US" sz="2400" dirty="0">
+                  <a:latin typeface="Arial Black" panose="020B0A04020102020204" pitchFamily="34" charset="0"/>
+                </a:rPr>
+                <a:t>Physiological Data</a:t>
+              </a:r>
+            </a:p>
+          </p:txBody>
+        </p:sp>
+        <p:sp>
+          <p:nvSpPr>
+            <p:cNvPr id="5" name="Oval 4">
+              <a:extLst>
+                <a:ext uri="{FF2B5EF4-FFF2-40B4-BE49-F238E27FC236}">
+                  <a16:creationId xmlns:a16="http://schemas.microsoft.com/office/drawing/2014/main" id="{F77DDBD1-4953-D6C4-0BDB-9A3CCBA8F3F8}"/>
+                </a:ext>
+              </a:extLst>
+            </p:cNvPr>
+            <p:cNvSpPr/>
+            <p:nvPr/>
+          </p:nvSpPr>
+          <p:spPr>
+            <a:xfrm>
+              <a:off x="4953000" y="3842657"/>
+              <a:ext cx="3657600" cy="3810000"/>
+            </a:xfrm>
+            <a:prstGeom prst="ellipse">
+              <a:avLst/>
+            </a:prstGeom>
+            <a:solidFill>
+              <a:srgbClr val="76D6C6">
+                <a:alpha val="95000"/>
+              </a:srgbClr>
+            </a:solidFill>
+            <a:ln>
+              <a:noFill/>
+            </a:ln>
+          </p:spPr>
+          <p:style>
+            <a:lnRef idx="2">
+              <a:schemeClr val="accent1">
+                <a:shade val="15000"/>
+              </a:schemeClr>
+            </a:lnRef>
+            <a:fillRef idx="1">
+              <a:schemeClr val="accent1"/>
+            </a:fillRef>
+            <a:effectRef idx="0">
+              <a:schemeClr val="accent1"/>
+            </a:effectRef>
+            <a:fontRef idx="minor">
+              <a:schemeClr val="lt1"/>
+            </a:fontRef>
+          </p:style>
+          <p:txBody>
+            <a:bodyPr rtlCol="0" anchor="ctr"/>
+            <a:lstStyle/>
+            <a:p>
+              <a:pPr algn="ctr"/>
+              <a:r>
+                <a:rPr lang="en-US" sz="2400" dirty="0">
+                  <a:latin typeface="Arial Black" panose="020B0A04020102020204" pitchFamily="34" charset="0"/>
+                </a:rPr>
+                <a:t>Software</a:t>
+              </a:r>
+            </a:p>
+            <a:p>
+              <a:pPr algn="ctr"/>
+              <a:r>
+                <a:rPr lang="en-US" sz="2400" dirty="0">
+                  <a:latin typeface="Arial Black" panose="020B0A04020102020204" pitchFamily="34" charset="0"/>
+                </a:rPr>
+                <a:t>solution</a:t>
+              </a:r>
+            </a:p>
+          </p:txBody>
+        </p:sp>
+      </p:grpSp>
+      <p:sp>
+        <p:nvSpPr>
+          <p:cNvPr id="8" name="TextBox 7">
+            <a:extLst>
+              <a:ext uri="{FF2B5EF4-FFF2-40B4-BE49-F238E27FC236}">
+                <a16:creationId xmlns:a16="http://schemas.microsoft.com/office/drawing/2014/main" id="{B33F82EB-D63D-E865-6665-4D73F9CE565A}"/>
+              </a:ext>
+            </a:extLst>
+          </p:cNvPr>
+          <p:cNvSpPr txBox="1"/>
+          <p:nvPr/>
+        </p:nvSpPr>
+        <p:spPr>
+          <a:xfrm>
+            <a:off x="10471517" y="1883229"/>
+            <a:ext cx="4089582" cy="1012650"/>
+          </a:xfrm>
+          <a:prstGeom prst="rect">
+            <a:avLst/>
+          </a:prstGeom>
+          <a:noFill/>
+        </p:spPr>
+        <p:txBody>
+          <a:bodyPr wrap="none" rtlCol="0">
+            <a:spAutoFit/>
+          </a:bodyPr>
+          <a:lstStyle/>
+          <a:p>
+            <a:pPr algn="ctr" defTabSz="914400">
+              <a:lnSpc>
+                <a:spcPct val="115000"/>
+              </a:lnSpc>
+              <a:spcBef>
+                <a:spcPts val="300"/>
+              </a:spcBef>
+            </a:pPr>
+            <a:r>
+              <a:rPr lang="en-US" sz="2600" b="1" spc="25" dirty="0">
+                <a:solidFill>
+                  <a:schemeClr val="bg1"/>
+                </a:solidFill>
+                <a:latin typeface="Open Sauce Light"/>
+              </a:rPr>
+              <a:t>Precise medical grade </a:t>
+            </a:r>
+          </a:p>
+          <a:p>
+            <a:pPr algn="ctr" defTabSz="914400">
+              <a:lnSpc>
+                <a:spcPct val="115000"/>
+              </a:lnSpc>
+              <a:spcBef>
+                <a:spcPts val="300"/>
+              </a:spcBef>
+            </a:pPr>
+            <a:r>
+              <a:rPr lang="en-US" sz="2600" b="1" spc="25" dirty="0">
+                <a:solidFill>
+                  <a:schemeClr val="bg1"/>
+                </a:solidFill>
+                <a:latin typeface="Open Sauce Light"/>
+              </a:rPr>
+              <a:t>measurements</a:t>
+            </a:r>
+          </a:p>
+        </p:txBody>
+      </p:sp>
+      <p:sp>
+        <p:nvSpPr>
+          <p:cNvPr id="9" name="TextBox 8">
+            <a:extLst>
+              <a:ext uri="{FF2B5EF4-FFF2-40B4-BE49-F238E27FC236}">
+                <a16:creationId xmlns:a16="http://schemas.microsoft.com/office/drawing/2014/main" id="{36C91C48-FCD5-5EFA-21D6-324856230EBE}"/>
+              </a:ext>
+            </a:extLst>
+          </p:cNvPr>
+          <p:cNvSpPr txBox="1"/>
+          <p:nvPr/>
+        </p:nvSpPr>
+        <p:spPr>
+          <a:xfrm>
+            <a:off x="262238" y="2895879"/>
+            <a:ext cx="6015444" cy="1511248"/>
+          </a:xfrm>
+          <a:prstGeom prst="rect">
+            <a:avLst/>
+          </a:prstGeom>
+          <a:noFill/>
+        </p:spPr>
+        <p:txBody>
+          <a:bodyPr wrap="square" rtlCol="0">
+            <a:spAutoFit/>
+          </a:bodyPr>
+          <a:lstStyle/>
+          <a:p>
+            <a:pPr algn="ctr" defTabSz="914400">
+              <a:lnSpc>
+                <a:spcPct val="115000"/>
+              </a:lnSpc>
+              <a:spcBef>
+                <a:spcPts val="300"/>
+              </a:spcBef>
+            </a:pPr>
+            <a:r>
+              <a:rPr lang="en-US" sz="2600" b="1" spc="25" dirty="0">
+                <a:solidFill>
+                  <a:schemeClr val="bg1"/>
+                </a:solidFill>
+                <a:latin typeface="Open Sauce Light"/>
+              </a:rPr>
+              <a:t>Seamless integration </a:t>
+            </a:r>
+          </a:p>
+          <a:p>
+            <a:pPr algn="ctr" defTabSz="914400">
+              <a:lnSpc>
+                <a:spcPct val="115000"/>
+              </a:lnSpc>
+              <a:spcBef>
+                <a:spcPts val="300"/>
+              </a:spcBef>
+            </a:pPr>
+            <a:r>
+              <a:rPr lang="en-US" sz="2600" b="1" spc="25" dirty="0">
+                <a:solidFill>
+                  <a:schemeClr val="bg1"/>
+                </a:solidFill>
+                <a:latin typeface="Open Sauce Light"/>
+              </a:rPr>
+              <a:t>with any Driver monitoring system (DMS)</a:t>
+            </a:r>
+          </a:p>
+        </p:txBody>
+      </p:sp>
+      <p:sp>
+        <p:nvSpPr>
+          <p:cNvPr id="10" name="TextBox 9">
+            <a:extLst>
+              <a:ext uri="{FF2B5EF4-FFF2-40B4-BE49-F238E27FC236}">
+                <a16:creationId xmlns:a16="http://schemas.microsoft.com/office/drawing/2014/main" id="{59232DBA-9338-776F-0EC3-30463ECDC69E}"/>
+              </a:ext>
+            </a:extLst>
+          </p:cNvPr>
+          <p:cNvSpPr txBox="1"/>
+          <p:nvPr/>
+        </p:nvSpPr>
+        <p:spPr>
+          <a:xfrm>
+            <a:off x="11963400" y="6378472"/>
+            <a:ext cx="4875053" cy="1012650"/>
+          </a:xfrm>
+          <a:prstGeom prst="rect">
+            <a:avLst/>
+          </a:prstGeom>
+          <a:noFill/>
+        </p:spPr>
+        <p:txBody>
+          <a:bodyPr wrap="none" rtlCol="0">
+            <a:spAutoFit/>
+          </a:bodyPr>
+          <a:lstStyle/>
+          <a:p>
+            <a:pPr algn="ctr" defTabSz="914400">
+              <a:lnSpc>
+                <a:spcPct val="115000"/>
+              </a:lnSpc>
+              <a:spcBef>
+                <a:spcPts val="300"/>
+              </a:spcBef>
+            </a:pPr>
+            <a:r>
+              <a:rPr lang="en-GB" sz="2600" b="1" spc="25" dirty="0">
+                <a:solidFill>
+                  <a:schemeClr val="bg1"/>
+                </a:solidFill>
+                <a:latin typeface="Open Sauce Light"/>
+              </a:rPr>
+              <a:t>enabling an understanding</a:t>
+            </a:r>
+          </a:p>
+          <a:p>
+            <a:pPr algn="ctr" defTabSz="914400">
+              <a:lnSpc>
+                <a:spcPct val="115000"/>
+              </a:lnSpc>
+              <a:spcBef>
+                <a:spcPts val="300"/>
+              </a:spcBef>
+            </a:pPr>
+            <a:r>
+              <a:rPr lang="en-GB" sz="2600" b="1" spc="25" dirty="0">
+                <a:solidFill>
+                  <a:schemeClr val="bg1"/>
+                </a:solidFill>
+                <a:latin typeface="Open Sauce Light"/>
+              </a:rPr>
+              <a:t> of the individual's condition</a:t>
+            </a:r>
+            <a:endParaRPr lang="en-US" sz="2600" b="1" spc="25" dirty="0">
+              <a:solidFill>
+                <a:schemeClr val="bg1"/>
+              </a:solidFill>
+              <a:latin typeface="Open Sauce Light"/>
+            </a:endParaRPr>
+          </a:p>
+        </p:txBody>
+      </p:sp>
+    </p:spTree>
+    <p:extLst>
+      <p:ext uri="{BB962C8B-B14F-4D97-AF65-F5344CB8AC3E}">
+        <p14:creationId xmlns:p14="http://schemas.microsoft.com/office/powerpoint/2010/main" val="514256140"/>
+      </p:ext>
+    </p:extLst>
+  </p:cSld>
+  <p:clrMapOvr>
+    <a:masterClrMapping/>
+  </p:clrMapOvr>
+</p:sld>
+</file>
+
+<file path=ppt/slides/slide11.xml><?xml version="1.0" encoding="utf-8"?>
+<p:sld xmlns:a="http://schemas.openxmlformats.org/drawingml/2006/main" xmlns:r="http://schemas.openxmlformats.org/officeDocument/2006/relationships" xmlns:p="http://schemas.openxmlformats.org/presentationml/2006/main">
+  <p:cSld>
+    <p:spTree>
+      <p:nvGrpSpPr>
+        <p:cNvPr id="1" name="">
+          <a:extLst>
+            <a:ext uri="{FF2B5EF4-FFF2-40B4-BE49-F238E27FC236}">
+              <a16:creationId xmlns:a16="http://schemas.microsoft.com/office/drawing/2014/main" id="{BCCA7294-F0D8-601D-7D4B-B6821B147F92}"/>
+            </a:ext>
+          </a:extLst>
+        </p:cNvPr>
+        <p:cNvGrpSpPr/>
+        <p:nvPr/>
+      </p:nvGrpSpPr>
+      <p:grpSpPr>
+        <a:xfrm>
+          <a:off x="0" y="0"/>
+          <a:ext cx="0" cy="0"/>
+          <a:chOff x="0" y="0"/>
+          <a:chExt cx="0" cy="0"/>
+        </a:xfrm>
+      </p:grpSpPr>
+      <p:sp>
+        <p:nvSpPr>
+          <p:cNvPr id="3" name="Rectangle 2">
+            <a:extLst>
+              <a:ext uri="{FF2B5EF4-FFF2-40B4-BE49-F238E27FC236}">
+                <a16:creationId xmlns:a16="http://schemas.microsoft.com/office/drawing/2014/main" id="{54DF3CE0-8BF1-C5B4-E160-987B50D0736A}"/>
+              </a:ext>
+            </a:extLst>
+          </p:cNvPr>
+          <p:cNvSpPr/>
+          <p:nvPr/>
+        </p:nvSpPr>
+        <p:spPr>
+          <a:xfrm>
+            <a:off x="2720748" y="2034422"/>
+            <a:ext cx="12824052" cy="7315200"/>
+          </a:xfrm>
+          <a:prstGeom prst="rect">
+            <a:avLst/>
+          </a:prstGeom>
+          <a:solidFill>
+            <a:srgbClr val="E5D6A4"/>
+          </a:solidFill>
+        </p:spPr>
+        <p:style>
+          <a:lnRef idx="2">
+            <a:schemeClr val="accent1">
+              <a:shade val="15000"/>
+            </a:schemeClr>
+          </a:lnRef>
+          <a:fillRef idx="1">
+            <a:schemeClr val="accent1"/>
+          </a:fillRef>
+          <a:effectRef idx="0">
+            <a:schemeClr val="accent1"/>
+          </a:effectRef>
+          <a:fontRef idx="minor">
+            <a:schemeClr val="lt1"/>
+          </a:fontRef>
+        </p:style>
+        <p:txBody>
+          <a:bodyPr rtlCol="0" anchor="ctr"/>
+          <a:lstStyle/>
+          <a:p>
+            <a:pPr algn="ctr"/>
+            <a:endParaRPr lang="en-US"/>
+          </a:p>
+        </p:txBody>
+      </p:sp>
+      <p:sp>
+        <p:nvSpPr>
+          <p:cNvPr id="8" name="TextBox 7">
+            <a:extLst>
+              <a:ext uri="{FF2B5EF4-FFF2-40B4-BE49-F238E27FC236}">
+                <a16:creationId xmlns:a16="http://schemas.microsoft.com/office/drawing/2014/main" id="{0DF85EB0-A424-0673-C821-2B718FBD009B}"/>
+              </a:ext>
+            </a:extLst>
+          </p:cNvPr>
+          <p:cNvSpPr txBox="1"/>
+          <p:nvPr/>
+        </p:nvSpPr>
+        <p:spPr>
+          <a:xfrm>
+            <a:off x="3380469" y="5177971"/>
+            <a:ext cx="7063152" cy="514051"/>
+          </a:xfrm>
+          <a:prstGeom prst="rect">
+            <a:avLst/>
+          </a:prstGeom>
+          <a:noFill/>
+        </p:spPr>
+        <p:txBody>
+          <a:bodyPr wrap="none" rtlCol="0">
+            <a:spAutoFit/>
+          </a:bodyPr>
+          <a:lstStyle/>
+          <a:p>
+            <a:pPr marL="457200" indent="-457200" defTabSz="914400">
+              <a:lnSpc>
+                <a:spcPct val="115000"/>
+              </a:lnSpc>
+              <a:spcBef>
+                <a:spcPts val="300"/>
+              </a:spcBef>
+              <a:buFont typeface="Arial" panose="020B0604020202020204" pitchFamily="34" charset="0"/>
+              <a:buChar char="•"/>
+            </a:pPr>
+            <a:r>
+              <a:rPr lang="en-US" sz="2600" b="1" spc="25" dirty="0">
+                <a:solidFill>
+                  <a:schemeClr val="bg1"/>
+                </a:solidFill>
+                <a:latin typeface="Open Sauce Light"/>
+              </a:rPr>
+              <a:t>Precise medical grade measurements</a:t>
+            </a:r>
+          </a:p>
+        </p:txBody>
+      </p:sp>
+      <p:sp>
+        <p:nvSpPr>
+          <p:cNvPr id="9" name="TextBox 8">
+            <a:extLst>
+              <a:ext uri="{FF2B5EF4-FFF2-40B4-BE49-F238E27FC236}">
+                <a16:creationId xmlns:a16="http://schemas.microsoft.com/office/drawing/2014/main" id="{FC96A651-2E47-FD37-945D-A18F29C98D3C}"/>
+              </a:ext>
+            </a:extLst>
+          </p:cNvPr>
+          <p:cNvSpPr txBox="1"/>
+          <p:nvPr/>
+        </p:nvSpPr>
+        <p:spPr>
+          <a:xfrm>
+            <a:off x="3344183" y="3585028"/>
+            <a:ext cx="11133817" cy="514051"/>
+          </a:xfrm>
+          <a:prstGeom prst="rect">
+            <a:avLst/>
+          </a:prstGeom>
+          <a:noFill/>
+        </p:spPr>
+        <p:txBody>
+          <a:bodyPr wrap="square" rtlCol="0">
+            <a:spAutoFit/>
+          </a:bodyPr>
+          <a:lstStyle/>
+          <a:p>
+            <a:pPr marL="457200" indent="-457200" defTabSz="914400">
+              <a:lnSpc>
+                <a:spcPct val="115000"/>
+              </a:lnSpc>
+              <a:spcBef>
+                <a:spcPts val="300"/>
+              </a:spcBef>
+              <a:buFont typeface="Arial" panose="020B0604020202020204" pitchFamily="34" charset="0"/>
+              <a:buChar char="•"/>
+            </a:pPr>
+            <a:r>
+              <a:rPr lang="en-US" sz="2600" b="1" spc="25" dirty="0">
+                <a:solidFill>
+                  <a:schemeClr val="bg1"/>
+                </a:solidFill>
+                <a:latin typeface="Open Sauce Light"/>
+              </a:rPr>
+              <a:t>Seamless integration with any Driver monitoring system (DMS)</a:t>
+            </a:r>
+          </a:p>
+        </p:txBody>
+      </p:sp>
+      <p:sp>
+        <p:nvSpPr>
+          <p:cNvPr id="10" name="TextBox 9">
+            <a:extLst>
+              <a:ext uri="{FF2B5EF4-FFF2-40B4-BE49-F238E27FC236}">
+                <a16:creationId xmlns:a16="http://schemas.microsoft.com/office/drawing/2014/main" id="{1E4AC0A4-A40B-0505-A708-BD29B873F40A}"/>
+              </a:ext>
+            </a:extLst>
+          </p:cNvPr>
+          <p:cNvSpPr txBox="1"/>
+          <p:nvPr/>
+        </p:nvSpPr>
+        <p:spPr>
+          <a:xfrm>
+            <a:off x="3347812" y="6819900"/>
+            <a:ext cx="9778639" cy="514051"/>
+          </a:xfrm>
+          <a:prstGeom prst="rect">
+            <a:avLst/>
+          </a:prstGeom>
+          <a:noFill/>
+        </p:spPr>
+        <p:txBody>
+          <a:bodyPr wrap="none" rtlCol="0">
+            <a:spAutoFit/>
+          </a:bodyPr>
+          <a:lstStyle/>
+          <a:p>
+            <a:pPr marL="457200" indent="-457200" defTabSz="914400">
+              <a:lnSpc>
+                <a:spcPct val="115000"/>
+              </a:lnSpc>
+              <a:spcBef>
+                <a:spcPts val="300"/>
+              </a:spcBef>
+              <a:buFont typeface="Arial" panose="020B0604020202020204" pitchFamily="34" charset="0"/>
+              <a:buChar char="•"/>
+            </a:pPr>
+            <a:r>
+              <a:rPr lang="en-GB" sz="2600" b="1" spc="25" dirty="0">
+                <a:solidFill>
+                  <a:schemeClr val="bg1"/>
+                </a:solidFill>
+                <a:latin typeface="Open Sauce Light"/>
+              </a:rPr>
+              <a:t>Enabling an understanding of the individual's condition</a:t>
+            </a:r>
+            <a:endParaRPr lang="en-US" sz="2600" b="1" spc="25" dirty="0">
+              <a:solidFill>
+                <a:schemeClr val="bg1"/>
+              </a:solidFill>
+              <a:latin typeface="Open Sauce Light"/>
+            </a:endParaRPr>
+          </a:p>
+        </p:txBody>
+      </p:sp>
+    </p:spTree>
+    <p:extLst>
+      <p:ext uri="{BB962C8B-B14F-4D97-AF65-F5344CB8AC3E}">
+        <p14:creationId xmlns:p14="http://schemas.microsoft.com/office/powerpoint/2010/main" val="1539531964"/>
+      </p:ext>
+    </p:extLst>
+  </p:cSld>
+  <p:clrMapOvr>
+    <a:masterClrMapping/>
+  </p:clrMapOvr>
+</p:sld>
+</file>
+
+<file path=ppt/slides/slide12.xml><?xml version="1.0" encoding="utf-8"?>
+<p:sld xmlns:a="http://schemas.openxmlformats.org/drawingml/2006/main" xmlns:r="http://schemas.openxmlformats.org/officeDocument/2006/relationships" xmlns:p="http://schemas.openxmlformats.org/presentationml/2006/main">
+  <p:cSld>
+    <p:spTree>
+      <p:nvGrpSpPr>
+        <p:cNvPr id="1" name=""/>
+        <p:cNvGrpSpPr/>
+        <p:nvPr/>
+      </p:nvGrpSpPr>
+      <p:grpSpPr>
+        <a:xfrm>
+          <a:off x="0" y="0"/>
+          <a:ext cx="0" cy="0"/>
+          <a:chOff x="0" y="0"/>
+          <a:chExt cx="0" cy="0"/>
+        </a:xfrm>
+      </p:grpSpPr>
+      <p:sp>
+        <p:nvSpPr>
+          <p:cNvPr id="2" name="Rectangle 1">
+            <a:extLst>
+              <a:ext uri="{FF2B5EF4-FFF2-40B4-BE49-F238E27FC236}">
+                <a16:creationId xmlns:a16="http://schemas.microsoft.com/office/drawing/2014/main" id="{377426B4-048F-A276-9CAD-B5D95D964E57}"/>
+              </a:ext>
+            </a:extLst>
+          </p:cNvPr>
+          <p:cNvSpPr/>
+          <p:nvPr/>
+        </p:nvSpPr>
+        <p:spPr>
+          <a:xfrm>
+            <a:off x="4495800" y="2019300"/>
+            <a:ext cx="9067800" cy="6172200"/>
+          </a:xfrm>
+          <a:prstGeom prst="rect">
+            <a:avLst/>
+          </a:prstGeom>
+          <a:solidFill>
+            <a:srgbClr val="3D2D2F"/>
+          </a:solidFill>
+        </p:spPr>
+        <p:style>
+          <a:lnRef idx="2">
+            <a:schemeClr val="accent1">
+              <a:shade val="15000"/>
+            </a:schemeClr>
+          </a:lnRef>
+          <a:fillRef idx="1">
+            <a:schemeClr val="accent1"/>
+          </a:fillRef>
+          <a:effectRef idx="0">
+            <a:schemeClr val="accent1"/>
+          </a:effectRef>
+          <a:fontRef idx="minor">
+            <a:schemeClr val="lt1"/>
+          </a:fontRef>
+        </p:style>
+        <p:txBody>
+          <a:bodyPr rtlCol="0" anchor="ctr"/>
+          <a:lstStyle/>
+          <a:p>
+            <a:pPr algn="ctr"/>
+            <a:endParaRPr lang="en-US"/>
+          </a:p>
+        </p:txBody>
+      </p:sp>
+      <p:pic>
+        <p:nvPicPr>
+          <p:cNvPr id="3" name="Picture 2">
+            <a:extLst>
+              <a:ext uri="{FF2B5EF4-FFF2-40B4-BE49-F238E27FC236}">
+                <a16:creationId xmlns:a16="http://schemas.microsoft.com/office/drawing/2014/main" id="{AAAE4CBE-68A4-F3C3-72DA-827778C326B0}"/>
+              </a:ext>
+            </a:extLst>
+          </p:cNvPr>
+          <p:cNvPicPr>
+            <a:picLocks noChangeAspect="1"/>
+          </p:cNvPicPr>
+          <p:nvPr/>
+        </p:nvPicPr>
+        <p:blipFill>
+          <a:blip r:embed="rId2">
+            <a:extLst>
+              <a:ext uri="{28A0092B-C50C-407E-A947-70E740481C1C}">
+                <a14:useLocalDpi xmlns:a14="http://schemas.microsoft.com/office/drawing/2010/main" val="0"/>
+              </a:ext>
+            </a:extLst>
+          </a:blip>
+          <a:stretch>
+            <a:fillRect/>
+          </a:stretch>
+        </p:blipFill>
+        <p:spPr>
+          <a:xfrm>
+            <a:off x="6648747" y="2552700"/>
+            <a:ext cx="4761905" cy="4761905"/>
+          </a:xfrm>
+          <a:prstGeom prst="rect">
+            <a:avLst/>
+          </a:prstGeom>
+        </p:spPr>
+      </p:pic>
+      <p:pic>
+        <p:nvPicPr>
+          <p:cNvPr id="5" name="Picture 4">
+            <a:extLst>
+              <a:ext uri="{FF2B5EF4-FFF2-40B4-BE49-F238E27FC236}">
+                <a16:creationId xmlns:a16="http://schemas.microsoft.com/office/drawing/2014/main" id="{4EA6D36B-8627-0859-755D-3D0A7EE46D96}"/>
+              </a:ext>
+            </a:extLst>
+          </p:cNvPr>
+          <p:cNvPicPr>
+            <a:picLocks noChangeAspect="1"/>
+          </p:cNvPicPr>
+          <p:nvPr/>
+        </p:nvPicPr>
+        <p:blipFill>
+          <a:blip r:embed="rId3"/>
+          <a:stretch>
+            <a:fillRect/>
+          </a:stretch>
+        </p:blipFill>
+        <p:spPr>
+          <a:xfrm>
+            <a:off x="14583072" y="7218448"/>
+            <a:ext cx="1133475" cy="971550"/>
+          </a:xfrm>
+          <a:prstGeom prst="rect">
+            <a:avLst/>
+          </a:prstGeom>
+        </p:spPr>
+      </p:pic>
+    </p:spTree>
+    <p:extLst>
+      <p:ext uri="{BB962C8B-B14F-4D97-AF65-F5344CB8AC3E}">
+        <p14:creationId xmlns:p14="http://schemas.microsoft.com/office/powerpoint/2010/main" val="1066501147"/>
+      </p:ext>
+    </p:extLst>
   </p:cSld>
   <p:clrMapOvr>
     <a:masterClrMapping/>
@@ -12877,7 +13840,13 @@
     </p:bg>
     <p:spTree>
       <p:nvGrpSpPr>
-        <p:cNvPr id="1" name=""/>
+        <p:cNvPr id="1" name="">
+          <a:extLst>
+            <a:ext uri="{FF2B5EF4-FFF2-40B4-BE49-F238E27FC236}">
+              <a16:creationId xmlns:a16="http://schemas.microsoft.com/office/drawing/2014/main" id="{E40D9E8D-0F02-3DEB-FF10-F00C7D4BD7DF}"/>
+            </a:ext>
+          </a:extLst>
+        </p:cNvPr>
         <p:cNvGrpSpPr/>
         <p:nvPr/>
       </p:nvGrpSpPr>
@@ -12889,12 +13858,349 @@
           <a:chExt cx="0" cy="0"/>
         </a:xfrm>
       </p:grpSpPr>
+      <p:sp>
+        <p:nvSpPr>
+          <p:cNvPr id="5" name="TextBox 16">
+            <a:extLst>
+              <a:ext uri="{FF2B5EF4-FFF2-40B4-BE49-F238E27FC236}">
+                <a16:creationId xmlns:a16="http://schemas.microsoft.com/office/drawing/2014/main" id="{CF18F31B-8E9C-9F8D-429B-0A4A80D63D94}"/>
+              </a:ext>
+            </a:extLst>
+          </p:cNvPr>
+          <p:cNvSpPr txBox="1"/>
+          <p:nvPr/>
+        </p:nvSpPr>
+        <p:spPr>
+          <a:xfrm>
+            <a:off x="228600" y="9715500"/>
+            <a:ext cx="5654218" cy="211512"/>
+          </a:xfrm>
+          <a:prstGeom prst="rect">
+            <a:avLst/>
+          </a:prstGeom>
+        </p:spPr>
+        <p:txBody>
+          <a:bodyPr lIns="0" tIns="0" rIns="0" bIns="0" rtlCol="0" anchor="t">
+            <a:spAutoFit/>
+          </a:bodyPr>
+          <a:lstStyle/>
+          <a:p>
+            <a:pPr>
+              <a:lnSpc>
+                <a:spcPts val="1680"/>
+              </a:lnSpc>
+            </a:pPr>
+            <a:r>
+              <a:rPr lang="en-US" sz="1400" spc="420" dirty="0">
+                <a:solidFill>
+                  <a:srgbClr val="000000"/>
+                </a:solidFill>
+                <a:latin typeface="Open Sauce Light"/>
+              </a:rPr>
+              <a:t>PROPRIETARY &amp; CONFIDENTIAL</a:t>
+            </a:r>
+          </a:p>
+        </p:txBody>
+      </p:sp>
+      <p:sp>
+        <p:nvSpPr>
+          <p:cNvPr id="14" name="TextBox 13">
+            <a:extLst>
+              <a:ext uri="{FF2B5EF4-FFF2-40B4-BE49-F238E27FC236}">
+                <a16:creationId xmlns:a16="http://schemas.microsoft.com/office/drawing/2014/main" id="{B859EC4C-9FE1-7C63-E44B-79D377FF64EB}"/>
+              </a:ext>
+            </a:extLst>
+          </p:cNvPr>
+          <p:cNvSpPr txBox="1"/>
+          <p:nvPr/>
+        </p:nvSpPr>
+        <p:spPr>
+          <a:xfrm>
+            <a:off x="-2667000" y="210313"/>
+            <a:ext cx="10665079" cy="949619"/>
+          </a:xfrm>
+          <a:prstGeom prst="rect">
+            <a:avLst/>
+          </a:prstGeom>
+          <a:noFill/>
+        </p:spPr>
+        <p:txBody>
+          <a:bodyPr wrap="square" rtlCol="0">
+            <a:spAutoFit/>
+          </a:bodyPr>
+          <a:lstStyle/>
+          <a:p>
+            <a:pPr algn="ctr">
+              <a:lnSpc>
+                <a:spcPts val="6600"/>
+              </a:lnSpc>
+            </a:pPr>
+            <a:r>
+              <a:rPr lang="en-US" sz="5500" dirty="0">
+                <a:solidFill>
+                  <a:schemeClr val="accent2"/>
+                </a:solidFill>
+                <a:latin typeface="League Spartan Bold"/>
+                <a:ea typeface="+mn-ea"/>
+                <a:cs typeface="+mn-cs"/>
+              </a:rPr>
+              <a:t>Go-to-Market</a:t>
+            </a:r>
+            <a:endParaRPr lang="en-GB" sz="5500" dirty="0">
+              <a:solidFill>
+                <a:schemeClr val="accent2"/>
+              </a:solidFill>
+              <a:latin typeface="League Spartan Bold"/>
+            </a:endParaRPr>
+          </a:p>
+        </p:txBody>
+      </p:sp>
+      <p:sp>
+        <p:nvSpPr>
+          <p:cNvPr id="13" name="TextBox 16">
+            <a:extLst>
+              <a:ext uri="{FF2B5EF4-FFF2-40B4-BE49-F238E27FC236}">
+                <a16:creationId xmlns:a16="http://schemas.microsoft.com/office/drawing/2014/main" id="{7310CC84-7B2B-F5F8-B590-66CBA15CFEEA}"/>
+              </a:ext>
+            </a:extLst>
+          </p:cNvPr>
+          <p:cNvSpPr txBox="1"/>
+          <p:nvPr/>
+        </p:nvSpPr>
+        <p:spPr>
+          <a:xfrm>
+            <a:off x="577932" y="11295351"/>
+            <a:ext cx="5654218" cy="211512"/>
+          </a:xfrm>
+          <a:prstGeom prst="rect">
+            <a:avLst/>
+          </a:prstGeom>
+        </p:spPr>
+        <p:txBody>
+          <a:bodyPr lIns="0" tIns="0" rIns="0" bIns="0" rtlCol="0" anchor="t">
+            <a:spAutoFit/>
+          </a:bodyPr>
+          <a:lstStyle/>
+          <a:p>
+            <a:pPr>
+              <a:lnSpc>
+                <a:spcPts val="1680"/>
+              </a:lnSpc>
+            </a:pPr>
+            <a:r>
+              <a:rPr lang="en-US" sz="1400" spc="420" dirty="0">
+                <a:solidFill>
+                  <a:schemeClr val="accent4"/>
+                </a:solidFill>
+                <a:latin typeface="Open Sauce Light"/>
+              </a:rPr>
+              <a:t>PROPRIETARY &amp; CONFIDENTIAL</a:t>
+            </a:r>
+          </a:p>
+        </p:txBody>
+      </p:sp>
+      <p:sp>
+        <p:nvSpPr>
+          <p:cNvPr id="3" name="TextBox 16">
+            <a:extLst>
+              <a:ext uri="{FF2B5EF4-FFF2-40B4-BE49-F238E27FC236}">
+                <a16:creationId xmlns:a16="http://schemas.microsoft.com/office/drawing/2014/main" id="{FEA5EA94-851A-AF2E-27CC-EC949825F550}"/>
+              </a:ext>
+            </a:extLst>
+          </p:cNvPr>
+          <p:cNvSpPr txBox="1"/>
+          <p:nvPr/>
+        </p:nvSpPr>
+        <p:spPr>
+          <a:xfrm>
+            <a:off x="14020800" y="418066"/>
+            <a:ext cx="5654218" cy="204800"/>
+          </a:xfrm>
+          <a:prstGeom prst="rect">
+            <a:avLst/>
+          </a:prstGeom>
+        </p:spPr>
+        <p:txBody>
+          <a:bodyPr lIns="0" tIns="0" rIns="0" bIns="0" rtlCol="0" anchor="t">
+            <a:spAutoFit/>
+          </a:bodyPr>
+          <a:lstStyle/>
+          <a:p>
+            <a:pPr>
+              <a:lnSpc>
+                <a:spcPts val="1680"/>
+              </a:lnSpc>
+            </a:pPr>
+            <a:r>
+              <a:rPr lang="en-US" sz="1400" spc="420" dirty="0">
+                <a:solidFill>
+                  <a:schemeClr val="accent4"/>
+                </a:solidFill>
+                <a:latin typeface="Open Sauce Light"/>
+              </a:rPr>
+              <a:t>PROPRIETARY &amp; CONFIDENTIAL</a:t>
+            </a:r>
+          </a:p>
+        </p:txBody>
+      </p:sp>
+      <p:sp>
+        <p:nvSpPr>
+          <p:cNvPr id="4" name="TextBox 3">
+            <a:extLst>
+              <a:ext uri="{FF2B5EF4-FFF2-40B4-BE49-F238E27FC236}">
+                <a16:creationId xmlns:a16="http://schemas.microsoft.com/office/drawing/2014/main" id="{7C23FCF1-A78D-ECC7-E477-8412252EF183}"/>
+              </a:ext>
+            </a:extLst>
+          </p:cNvPr>
+          <p:cNvSpPr txBox="1"/>
+          <p:nvPr/>
+        </p:nvSpPr>
+        <p:spPr>
+          <a:xfrm>
+            <a:off x="75079" y="9791700"/>
+            <a:ext cx="1067921" cy="369332"/>
+          </a:xfrm>
+          <a:prstGeom prst="rect">
+            <a:avLst/>
+          </a:prstGeom>
+          <a:noFill/>
+        </p:spPr>
+        <p:txBody>
+          <a:bodyPr wrap="none" rtlCol="0">
+            <a:spAutoFit/>
+          </a:bodyPr>
+          <a:lstStyle/>
+          <a:p>
+            <a:r>
+              <a:rPr lang="en-GB" i="1" dirty="0">
+                <a:solidFill>
+                  <a:srgbClr val="FF9900"/>
+                </a:solidFill>
+              </a:rPr>
+              <a:t>HeartRay</a:t>
+            </a:r>
+            <a:endParaRPr lang="en-US" i="1" dirty="0">
+              <a:solidFill>
+                <a:srgbClr val="FF9900"/>
+              </a:solidFill>
+            </a:endParaRPr>
+          </a:p>
+        </p:txBody>
+      </p:sp>
+      <p:pic>
+        <p:nvPicPr>
+          <p:cNvPr id="6" name="Graphic 5" descr="Eye with solid fill">
+            <a:extLst>
+              <a:ext uri="{FF2B5EF4-FFF2-40B4-BE49-F238E27FC236}">
+                <a16:creationId xmlns:a16="http://schemas.microsoft.com/office/drawing/2014/main" id="{CB8835BB-1FEA-B313-404F-59F58E8323EE}"/>
+              </a:ext>
+            </a:extLst>
+          </p:cNvPr>
+          <p:cNvPicPr>
+            <a:picLocks noChangeAspect="1"/>
+          </p:cNvPicPr>
+          <p:nvPr/>
+        </p:nvPicPr>
+        <p:blipFill>
+          <a:blip r:embed="rId3">
+            <a:extLst>
+              <a:ext uri="{96DAC541-7B7A-43D3-8B79-37D633B846F1}">
+                <asvg:svgBlip xmlns:asvg="http://schemas.microsoft.com/office/drawing/2016/SVG/main" r:embed="rId4"/>
+              </a:ext>
+            </a:extLst>
+          </a:blip>
+          <a:stretch>
+            <a:fillRect/>
+          </a:stretch>
+        </p:blipFill>
+        <p:spPr>
+          <a:xfrm>
+            <a:off x="9781766" y="6242409"/>
+            <a:ext cx="914400" cy="914400"/>
+          </a:xfrm>
+          <a:prstGeom prst="rect">
+            <a:avLst/>
+          </a:prstGeom>
+        </p:spPr>
+      </p:pic>
+      <p:pic>
+        <p:nvPicPr>
+          <p:cNvPr id="8" name="Graphic 7" descr="Heart with pulse with solid fill">
+            <a:extLst>
+              <a:ext uri="{FF2B5EF4-FFF2-40B4-BE49-F238E27FC236}">
+                <a16:creationId xmlns:a16="http://schemas.microsoft.com/office/drawing/2014/main" id="{9FF9C243-D300-4AE7-346B-7191BD8BF09B}"/>
+              </a:ext>
+            </a:extLst>
+          </p:cNvPr>
+          <p:cNvPicPr>
+            <a:picLocks noChangeAspect="1"/>
+          </p:cNvPicPr>
+          <p:nvPr/>
+        </p:nvPicPr>
+        <p:blipFill>
+          <a:blip r:embed="rId5">
+            <a:extLst>
+              <a:ext uri="{96DAC541-7B7A-43D3-8B79-37D633B846F1}">
+                <asvg:svgBlip xmlns:asvg="http://schemas.microsoft.com/office/drawing/2016/SVG/main" r:embed="rId6"/>
+              </a:ext>
+            </a:extLst>
+          </a:blip>
+          <a:stretch>
+            <a:fillRect/>
+          </a:stretch>
+        </p:blipFill>
+        <p:spPr>
+          <a:xfrm>
+            <a:off x="10972800" y="2777816"/>
+            <a:ext cx="1328143" cy="1328143"/>
+          </a:xfrm>
+          <a:prstGeom prst="rect">
+            <a:avLst/>
+          </a:prstGeom>
+        </p:spPr>
+      </p:pic>
+      <p:pic>
+        <p:nvPicPr>
+          <p:cNvPr id="10" name="Graphic 9" descr="Lungs with solid fill">
+            <a:extLst>
+              <a:ext uri="{FF2B5EF4-FFF2-40B4-BE49-F238E27FC236}">
+                <a16:creationId xmlns:a16="http://schemas.microsoft.com/office/drawing/2014/main" id="{EDA8DC94-C275-AC85-5AE9-D2C6900358FC}"/>
+              </a:ext>
+            </a:extLst>
+          </p:cNvPr>
+          <p:cNvPicPr>
+            <a:picLocks noChangeAspect="1"/>
+          </p:cNvPicPr>
+          <p:nvPr/>
+        </p:nvPicPr>
+        <p:blipFill>
+          <a:blip r:embed="rId7">
+            <a:extLst>
+              <a:ext uri="{96DAC541-7B7A-43D3-8B79-37D633B846F1}">
+                <asvg:svgBlip xmlns:asvg="http://schemas.microsoft.com/office/drawing/2016/SVG/main" r:embed="rId8"/>
+              </a:ext>
+            </a:extLst>
+          </a:blip>
+          <a:stretch>
+            <a:fillRect/>
+          </a:stretch>
+        </p:blipFill>
+        <p:spPr>
+          <a:xfrm>
+            <a:off x="7334007" y="2777816"/>
+            <a:ext cx="1328143" cy="1328143"/>
+          </a:xfrm>
+          <a:prstGeom prst="rect">
+            <a:avLst/>
+          </a:prstGeom>
+        </p:spPr>
+      </p:pic>
       <p:grpSp>
         <p:nvGrpSpPr>
-          <p:cNvPr id="7" name="Group 6">
+          <p:cNvPr id="22" name="Group 21">
             <a:extLst>
               <a:ext uri="{FF2B5EF4-FFF2-40B4-BE49-F238E27FC236}">
-                <a16:creationId xmlns:a16="http://schemas.microsoft.com/office/drawing/2014/main" id="{161CA642-011C-022B-62B0-5AA22758E270}"/>
+                <a16:creationId xmlns:a16="http://schemas.microsoft.com/office/drawing/2014/main" id="{900BAA0C-E329-7F9C-E357-5C7628B600FF}"/>
               </a:ext>
             </a:extLst>
           </p:cNvPr>
@@ -12903,18 +14209,147 @@
         </p:nvGrpSpPr>
         <p:grpSpPr>
           <a:xfrm>
-            <a:off x="5562600" y="1943100"/>
-            <a:ext cx="5486400" cy="5105400"/>
-            <a:chOff x="4953000" y="1181100"/>
-            <a:chExt cx="6781800" cy="6477000"/>
+            <a:off x="5476586" y="6013809"/>
+            <a:ext cx="1371600" cy="1371600"/>
+            <a:chOff x="8686800" y="4229100"/>
+            <a:chExt cx="1371600" cy="1371600"/>
           </a:xfrm>
         </p:grpSpPr>
+        <p:pic>
+          <p:nvPicPr>
+            <p:cNvPr id="18" name="Graphic 17" descr="Arrow circle with solid fill">
+              <a:extLst>
+                <a:ext uri="{FF2B5EF4-FFF2-40B4-BE49-F238E27FC236}">
+                  <a16:creationId xmlns:a16="http://schemas.microsoft.com/office/drawing/2014/main" id="{2870828C-EC37-C3C4-D055-AE876628DA0E}"/>
+                </a:ext>
+              </a:extLst>
+            </p:cNvPr>
+            <p:cNvPicPr>
+              <a:picLocks noChangeAspect="1"/>
+            </p:cNvPicPr>
+            <p:nvPr/>
+          </p:nvPicPr>
+          <p:blipFill>
+            <a:blip r:embed="rId9">
+              <a:extLst>
+                <a:ext uri="{96DAC541-7B7A-43D3-8B79-37D633B846F1}">
+                  <asvg:svgBlip xmlns:asvg="http://schemas.microsoft.com/office/drawing/2016/SVG/main" r:embed="rId10"/>
+                </a:ext>
+              </a:extLst>
+            </a:blip>
+            <a:stretch>
+              <a:fillRect/>
+            </a:stretch>
+          </p:blipFill>
+          <p:spPr>
+            <a:xfrm>
+              <a:off x="8686800" y="4229100"/>
+              <a:ext cx="1371600" cy="1371600"/>
+            </a:xfrm>
+            <a:prstGeom prst="rect">
+              <a:avLst/>
+            </a:prstGeom>
+          </p:spPr>
+        </p:pic>
+        <p:pic>
+          <p:nvPicPr>
+            <p:cNvPr id="21" name="Graphic 20" descr="Water with solid fill">
+              <a:extLst>
+                <a:ext uri="{FF2B5EF4-FFF2-40B4-BE49-F238E27FC236}">
+                  <a16:creationId xmlns:a16="http://schemas.microsoft.com/office/drawing/2014/main" id="{D6F38CB9-56DD-5C68-1E6C-3CF7F3357D15}"/>
+                </a:ext>
+              </a:extLst>
+            </p:cNvPr>
+            <p:cNvPicPr>
+              <a:picLocks noChangeAspect="1"/>
+            </p:cNvPicPr>
+            <p:nvPr/>
+          </p:nvPicPr>
+          <p:blipFill>
+            <a:blip r:embed="rId11">
+              <a:extLst>
+                <a:ext uri="{96DAC541-7B7A-43D3-8B79-37D633B846F1}">
+                  <asvg:svgBlip xmlns:asvg="http://schemas.microsoft.com/office/drawing/2016/SVG/main" r:embed="rId12"/>
+                </a:ext>
+              </a:extLst>
+            </a:blip>
+            <a:stretch>
+              <a:fillRect/>
+            </a:stretch>
+          </p:blipFill>
+          <p:spPr>
+            <a:xfrm>
+              <a:off x="9067800" y="4589991"/>
+              <a:ext cx="609600" cy="609600"/>
+            </a:xfrm>
+            <a:prstGeom prst="rect">
+              <a:avLst/>
+            </a:prstGeom>
+          </p:spPr>
+        </p:pic>
+      </p:grpSp>
+      <p:grpSp>
+        <p:nvGrpSpPr>
+          <p:cNvPr id="29" name="Group 28">
+            <a:extLst>
+              <a:ext uri="{FF2B5EF4-FFF2-40B4-BE49-F238E27FC236}">
+                <a16:creationId xmlns:a16="http://schemas.microsoft.com/office/drawing/2014/main" id="{B2FCF223-3708-A02C-8158-BA4EDD91B1AB}"/>
+              </a:ext>
+            </a:extLst>
+          </p:cNvPr>
+          <p:cNvGrpSpPr/>
+          <p:nvPr/>
+        </p:nvGrpSpPr>
+        <p:grpSpPr>
+          <a:xfrm>
+            <a:off x="3819816" y="2589294"/>
+            <a:ext cx="1656770" cy="1586529"/>
+            <a:chOff x="10077449" y="4017150"/>
+            <a:chExt cx="1638301" cy="1638301"/>
+          </a:xfrm>
+        </p:grpSpPr>
+        <p:pic>
+          <p:nvPicPr>
+            <p:cNvPr id="25" name="Graphic 24" descr="Heart with solid fill">
+              <a:extLst>
+                <a:ext uri="{FF2B5EF4-FFF2-40B4-BE49-F238E27FC236}">
+                  <a16:creationId xmlns:a16="http://schemas.microsoft.com/office/drawing/2014/main" id="{0D2A7CE8-577B-040E-EE0D-CDA4CC4F5D9D}"/>
+                </a:ext>
+              </a:extLst>
+            </p:cNvPr>
+            <p:cNvPicPr>
+              <a:picLocks noChangeAspect="1"/>
+            </p:cNvPicPr>
+            <p:nvPr/>
+          </p:nvPicPr>
+          <p:blipFill>
+            <a:blip r:embed="rId13">
+              <a:extLst>
+                <a:ext uri="{96DAC541-7B7A-43D3-8B79-37D633B846F1}">
+                  <asvg:svgBlip xmlns:asvg="http://schemas.microsoft.com/office/drawing/2016/SVG/main" r:embed="rId14"/>
+                </a:ext>
+              </a:extLst>
+            </a:blip>
+            <a:stretch>
+              <a:fillRect/>
+            </a:stretch>
+          </p:blipFill>
+          <p:spPr>
+            <a:xfrm>
+              <a:off x="10077449" y="4017150"/>
+              <a:ext cx="1638301" cy="1638301"/>
+            </a:xfrm>
+            <a:prstGeom prst="rect">
+              <a:avLst/>
+            </a:prstGeom>
+          </p:spPr>
+        </p:pic>
         <p:sp>
           <p:nvSpPr>
-            <p:cNvPr id="2" name="Oval 1">
+            <p:cNvPr id="28" name="Cross 27">
               <a:extLst>
                 <a:ext uri="{FF2B5EF4-FFF2-40B4-BE49-F238E27FC236}">
-                  <a16:creationId xmlns:a16="http://schemas.microsoft.com/office/drawing/2014/main" id="{62A7F912-B268-5D40-E5B0-D07C23A434C8}"/>
+                  <a16:creationId xmlns:a16="http://schemas.microsoft.com/office/drawing/2014/main" id="{4C51EE3A-EBE3-7D14-D978-8F8CA3BC30C6}"/>
                 </a:ext>
               </a:extLst>
             </p:cNvPr>
@@ -12923,19 +14358,21 @@
           </p:nvSpPr>
           <p:spPr>
             <a:xfrm>
-              <a:off x="6629400" y="1181100"/>
-              <a:ext cx="3657600" cy="3810000"/>
+              <a:off x="10896601" y="4836302"/>
+              <a:ext cx="573314" cy="611998"/>
             </a:xfrm>
-            <a:prstGeom prst="ellipse">
-              <a:avLst/>
+            <a:prstGeom prst="plus">
+              <a:avLst>
+                <a:gd name="adj" fmla="val 30455"/>
+              </a:avLst>
             </a:prstGeom>
             <a:solidFill>
-              <a:schemeClr val="accent2">
-                <a:lumMod val="75000"/>
-              </a:schemeClr>
+              <a:schemeClr val="bg1"/>
             </a:solidFill>
-            <a:ln>
-              <a:noFill/>
+            <a:ln w="38100">
+              <a:solidFill>
+                <a:srgbClr val="E5D6A4"/>
+              </a:solidFill>
             </a:ln>
           </p:spPr>
           <p:style>
@@ -12959,167 +14396,17 @@
             <a:lstStyle/>
             <a:p>
               <a:pPr algn="ctr"/>
-              <a:r>
-                <a:rPr lang="en-US" sz="2000" dirty="0">
-                  <a:latin typeface="Arial Black" panose="020B0A04020102020204" pitchFamily="34" charset="0"/>
-                </a:rPr>
-                <a:t>Cutting edge </a:t>
-              </a:r>
-            </a:p>
-            <a:p>
-              <a:pPr algn="ctr"/>
-              <a:r>
-                <a:rPr lang="en-US" sz="2000" dirty="0">
-                  <a:latin typeface="Arial Black" panose="020B0A04020102020204" pitchFamily="34" charset="0"/>
-                </a:rPr>
-                <a:t>Technology</a:t>
-              </a:r>
-            </a:p>
-          </p:txBody>
-        </p:sp>
-        <p:sp>
-          <p:nvSpPr>
-            <p:cNvPr id="6" name="Oval 5">
-              <a:extLst>
-                <a:ext uri="{FF2B5EF4-FFF2-40B4-BE49-F238E27FC236}">
-                  <a16:creationId xmlns:a16="http://schemas.microsoft.com/office/drawing/2014/main" id="{BF26A61C-6C7F-4DBE-6099-8927279C9E66}"/>
-                </a:ext>
-              </a:extLst>
-            </p:cNvPr>
-            <p:cNvSpPr/>
-            <p:nvPr/>
-          </p:nvSpPr>
-          <p:spPr>
-            <a:xfrm>
-              <a:off x="8077200" y="3848100"/>
-              <a:ext cx="3657600" cy="3810000"/>
-            </a:xfrm>
-            <a:prstGeom prst="ellipse">
-              <a:avLst/>
-            </a:prstGeom>
-            <a:solidFill>
-              <a:srgbClr val="FB51D7">
-                <a:alpha val="90000"/>
-              </a:srgbClr>
-            </a:solidFill>
-            <a:ln>
-              <a:noFill/>
-            </a:ln>
-          </p:spPr>
-          <p:style>
-            <a:lnRef idx="2">
-              <a:schemeClr val="accent1">
-                <a:shade val="15000"/>
-              </a:schemeClr>
-            </a:lnRef>
-            <a:fillRef idx="1">
-              <a:schemeClr val="accent1"/>
-            </a:fillRef>
-            <a:effectRef idx="0">
-              <a:schemeClr val="accent1"/>
-            </a:effectRef>
-            <a:fontRef idx="minor">
-              <a:schemeClr val="lt1"/>
-            </a:fontRef>
-          </p:style>
-          <p:txBody>
-            <a:bodyPr rtlCol="0" anchor="ctr"/>
-            <a:lstStyle/>
-            <a:p>
-              <a:pPr algn="ctr"/>
-              <a:r>
-                <a:rPr lang="en-US" sz="2000" dirty="0">
-                  <a:latin typeface="Arial Black" panose="020B0A04020102020204" pitchFamily="34" charset="0"/>
-                </a:rPr>
-                <a:t>Various </a:t>
-              </a:r>
-            </a:p>
-            <a:p>
-              <a:pPr algn="ctr"/>
-              <a:r>
-                <a:rPr lang="en-US" sz="2000" dirty="0">
-                  <a:latin typeface="Arial Black" panose="020B0A04020102020204" pitchFamily="34" charset="0"/>
-                </a:rPr>
-                <a:t>Physiological Data</a:t>
-              </a:r>
-            </a:p>
-          </p:txBody>
-        </p:sp>
-        <p:sp>
-          <p:nvSpPr>
-            <p:cNvPr id="5" name="Oval 4">
-              <a:extLst>
-                <a:ext uri="{FF2B5EF4-FFF2-40B4-BE49-F238E27FC236}">
-                  <a16:creationId xmlns:a16="http://schemas.microsoft.com/office/drawing/2014/main" id="{F77DDBD1-4953-D6C4-0BDB-9A3CCBA8F3F8}"/>
-                </a:ext>
-              </a:extLst>
-            </p:cNvPr>
-            <p:cNvSpPr/>
-            <p:nvPr/>
-          </p:nvSpPr>
-          <p:spPr>
-            <a:xfrm>
-              <a:off x="4953000" y="3842657"/>
-              <a:ext cx="3657600" cy="3810000"/>
-            </a:xfrm>
-            <a:prstGeom prst="ellipse">
-              <a:avLst/>
-            </a:prstGeom>
-            <a:solidFill>
-              <a:srgbClr val="76D6C6">
-                <a:alpha val="95000"/>
-              </a:srgbClr>
-            </a:solidFill>
-            <a:ln>
-              <a:noFill/>
-            </a:ln>
-          </p:spPr>
-          <p:style>
-            <a:lnRef idx="2">
-              <a:schemeClr val="accent1">
-                <a:shade val="15000"/>
-              </a:schemeClr>
-            </a:lnRef>
-            <a:fillRef idx="1">
-              <a:schemeClr val="accent1"/>
-            </a:fillRef>
-            <a:effectRef idx="0">
-              <a:schemeClr val="accent1"/>
-            </a:effectRef>
-            <a:fontRef idx="minor">
-              <a:schemeClr val="lt1"/>
-            </a:fontRef>
-          </p:style>
-          <p:txBody>
-            <a:bodyPr rtlCol="0" anchor="ctr"/>
-            <a:lstStyle/>
-            <a:p>
-              <a:pPr algn="ctr"/>
-              <a:r>
-                <a:rPr lang="en-US" sz="2000" dirty="0">
-                  <a:latin typeface="Arial Black" panose="020B0A04020102020204" pitchFamily="34" charset="0"/>
-                </a:rPr>
-                <a:t>Software</a:t>
-              </a:r>
-            </a:p>
-            <a:p>
-              <a:pPr algn="ctr"/>
-              <a:r>
-                <a:rPr lang="en-US" sz="2000" dirty="0">
-                  <a:latin typeface="Arial Black" panose="020B0A04020102020204" pitchFamily="34" charset="0"/>
-                </a:rPr>
-                <a:t>solution</a:t>
-              </a:r>
+              <a:endParaRPr lang="en-US"/>
             </a:p>
           </p:txBody>
         </p:sp>
       </p:grpSp>
       <p:sp>
         <p:nvSpPr>
-          <p:cNvPr id="8" name="TextBox 7">
+          <p:cNvPr id="30" name="TextBox 29">
             <a:extLst>
               <a:ext uri="{FF2B5EF4-FFF2-40B4-BE49-F238E27FC236}">
-                <a16:creationId xmlns:a16="http://schemas.microsoft.com/office/drawing/2014/main" id="{B33F82EB-D63D-E865-6665-4D73F9CE565A}"/>
+                <a16:creationId xmlns:a16="http://schemas.microsoft.com/office/drawing/2014/main" id="{43BC922B-15FE-EA29-FDF6-39C7B97526BE}"/>
               </a:ext>
             </a:extLst>
           </p:cNvPr>
@@ -13128,8 +14415,8 @@
         </p:nvSpPr>
         <p:spPr>
           <a:xfrm>
-            <a:off x="10515600" y="1883229"/>
-            <a:ext cx="4001416" cy="954107"/>
+            <a:off x="3658186" y="2014220"/>
+            <a:ext cx="1980030" cy="514051"/>
           </a:xfrm>
           <a:prstGeom prst="rect">
             <a:avLst/>
@@ -13142,44 +14429,32 @@
           </a:bodyPr>
           <a:lstStyle/>
           <a:p>
-            <a:r>
-              <a:rPr lang="en-US" sz="2800" dirty="0">
-                <a:solidFill>
-                  <a:srgbClr val="002060"/>
-                </a:solidFill>
-                <a:latin typeface="Aharoni" panose="02010803020104030203" pitchFamily="2" charset="-79"/>
-                <a:cs typeface="Aharoni" panose="02010803020104030203" pitchFamily="2" charset="-79"/>
+            <a:pPr algn="ctr" defTabSz="914400">
+              <a:lnSpc>
+                <a:spcPct val="115000"/>
+              </a:lnSpc>
+              <a:spcBef>
+                <a:spcPts val="300"/>
+              </a:spcBef>
+            </a:pPr>
+            <a:r>
+              <a:rPr lang="en-US" sz="2600" b="1" spc="25" dirty="0">
+                <a:solidFill>
+                  <a:schemeClr val="bg1"/>
+                </a:solidFill>
+                <a:latin typeface="Open Sauce Light"/>
               </a:rPr>
-              <a:t>Precise medical grade </a:t>
-            </a:r>
-          </a:p>
-          <a:p>
-            <a:r>
-              <a:rPr lang="en-US" sz="2800" dirty="0">
-                <a:solidFill>
-                  <a:srgbClr val="002060"/>
-                </a:solidFill>
-                <a:latin typeface="Aharoni" panose="02010803020104030203" pitchFamily="2" charset="-79"/>
-                <a:cs typeface="Aharoni" panose="02010803020104030203" pitchFamily="2" charset="-79"/>
-              </a:rPr>
-              <a:t>measurements</a:t>
-            </a:r>
-            <a:endParaRPr lang="en-US" sz="2800" dirty="0">
-              <a:solidFill>
-                <a:srgbClr val="002060"/>
-              </a:solidFill>
-              <a:latin typeface="Arial Black" panose="020B0A04020102020204" pitchFamily="34" charset="0"/>
-              <a:cs typeface="Aharoni" panose="02010803020104030203" pitchFamily="2" charset="-79"/>
-            </a:endParaRPr>
-          </a:p>
-        </p:txBody>
-      </p:sp>
-      <p:sp>
-        <p:nvSpPr>
-          <p:cNvPr id="9" name="TextBox 8">
+              <a:t>Heart Rate</a:t>
+            </a:r>
+          </a:p>
+        </p:txBody>
+      </p:sp>
+      <p:sp>
+        <p:nvSpPr>
+          <p:cNvPr id="31" name="TextBox 30">
             <a:extLst>
               <a:ext uri="{FF2B5EF4-FFF2-40B4-BE49-F238E27FC236}">
-                <a16:creationId xmlns:a16="http://schemas.microsoft.com/office/drawing/2014/main" id="{36C91C48-FCD5-5EFA-21D6-324856230EBE}"/>
+                <a16:creationId xmlns:a16="http://schemas.microsoft.com/office/drawing/2014/main" id="{D5BAD98C-367C-2997-CA3A-90CADFA95868}"/>
               </a:ext>
             </a:extLst>
           </p:cNvPr>
@@ -13188,8 +14463,8 @@
         </p:nvSpPr>
         <p:spPr>
           <a:xfrm>
-            <a:off x="2046198" y="3771900"/>
-            <a:ext cx="3828292" cy="954107"/>
+            <a:off x="6958372" y="2014219"/>
+            <a:ext cx="2079415" cy="514051"/>
           </a:xfrm>
           <a:prstGeom prst="rect">
             <a:avLst/>
@@ -13202,44 +14477,32 @@
           </a:bodyPr>
           <a:lstStyle/>
           <a:p>
-            <a:r>
-              <a:rPr lang="en-US" sz="2800" dirty="0">
-                <a:solidFill>
-                  <a:srgbClr val="002060"/>
-                </a:solidFill>
-                <a:latin typeface="Aharoni" panose="02010803020104030203" pitchFamily="2" charset="-79"/>
-                <a:cs typeface="Aharoni" panose="02010803020104030203" pitchFamily="2" charset="-79"/>
+            <a:pPr algn="ctr" defTabSz="914400">
+              <a:lnSpc>
+                <a:spcPct val="115000"/>
+              </a:lnSpc>
+              <a:spcBef>
+                <a:spcPts val="300"/>
+              </a:spcBef>
+            </a:pPr>
+            <a:r>
+              <a:rPr lang="en-US" sz="2600" b="1" spc="25" dirty="0">
+                <a:solidFill>
+                  <a:schemeClr val="bg1"/>
+                </a:solidFill>
+                <a:latin typeface="Open Sauce Light"/>
               </a:rPr>
-              <a:t>Seamless integration </a:t>
-            </a:r>
-          </a:p>
-          <a:p>
-            <a:r>
-              <a:rPr lang="en-US" sz="2800" dirty="0">
-                <a:solidFill>
-                  <a:srgbClr val="002060"/>
-                </a:solidFill>
-                <a:latin typeface="Aharoni" panose="02010803020104030203" pitchFamily="2" charset="-79"/>
-                <a:cs typeface="Aharoni" panose="02010803020104030203" pitchFamily="2" charset="-79"/>
-              </a:rPr>
-              <a:t>with any DMS</a:t>
-            </a:r>
-            <a:endParaRPr lang="en-US" sz="2800" dirty="0">
-              <a:solidFill>
-                <a:srgbClr val="002060"/>
-              </a:solidFill>
-              <a:latin typeface="Arial Black" panose="020B0A04020102020204" pitchFamily="34" charset="0"/>
-              <a:cs typeface="Aharoni" panose="02010803020104030203" pitchFamily="2" charset="-79"/>
-            </a:endParaRPr>
-          </a:p>
-        </p:txBody>
-      </p:sp>
-      <p:sp>
-        <p:nvSpPr>
-          <p:cNvPr id="10" name="TextBox 9">
+              <a:t>Respiration</a:t>
+            </a:r>
+          </a:p>
+        </p:txBody>
+      </p:sp>
+      <p:sp>
+        <p:nvSpPr>
+          <p:cNvPr id="32" name="TextBox 31">
             <a:extLst>
               <a:ext uri="{FF2B5EF4-FFF2-40B4-BE49-F238E27FC236}">
-                <a16:creationId xmlns:a16="http://schemas.microsoft.com/office/drawing/2014/main" id="{59232DBA-9338-776F-0EC3-30463ECDC69E}"/>
+                <a16:creationId xmlns:a16="http://schemas.microsoft.com/office/drawing/2014/main" id="{116D0AB1-A9DB-32E2-E681-CDFD23D79B9C}"/>
               </a:ext>
             </a:extLst>
           </p:cNvPr>
@@ -13248,8 +14511,8 @@
         </p:nvSpPr>
         <p:spPr>
           <a:xfrm>
-            <a:off x="11582400" y="6001180"/>
-            <a:ext cx="4948791" cy="954107"/>
+            <a:off x="10823521" y="2014219"/>
+            <a:ext cx="1683474" cy="514051"/>
           </a:xfrm>
           <a:prstGeom prst="rect">
             <a:avLst/>
@@ -13262,42 +14525,126 @@
           </a:bodyPr>
           <a:lstStyle/>
           <a:p>
-            <a:r>
-              <a:rPr lang="en-GB" sz="2800" dirty="0">
-                <a:solidFill>
-                  <a:srgbClr val="002060"/>
-                </a:solidFill>
-                <a:latin typeface="Aharoni" panose="02010803020104030203" pitchFamily="2" charset="-79"/>
-                <a:cs typeface="Aharoni" panose="02010803020104030203" pitchFamily="2" charset="-79"/>
+            <a:pPr algn="ctr" defTabSz="914400">
+              <a:lnSpc>
+                <a:spcPct val="115000"/>
+              </a:lnSpc>
+              <a:spcBef>
+                <a:spcPts val="300"/>
+              </a:spcBef>
+            </a:pPr>
+            <a:r>
+              <a:rPr lang="en-US" sz="2600" b="1" spc="25" dirty="0">
+                <a:solidFill>
+                  <a:schemeClr val="bg1"/>
+                </a:solidFill>
+                <a:latin typeface="Open Sauce Light"/>
               </a:rPr>
-              <a:t>enabling an understanding</a:t>
-            </a:r>
-          </a:p>
-          <a:p>
-            <a:r>
-              <a:rPr lang="en-GB" sz="2800" dirty="0">
-                <a:solidFill>
-                  <a:srgbClr val="002060"/>
-                </a:solidFill>
-                <a:latin typeface="Aharoni" panose="02010803020104030203" pitchFamily="2" charset="-79"/>
-                <a:cs typeface="Aharoni" panose="02010803020104030203" pitchFamily="2" charset="-79"/>
+              <a:t>HRV / IBI</a:t>
+            </a:r>
+          </a:p>
+        </p:txBody>
+      </p:sp>
+      <p:sp>
+        <p:nvSpPr>
+          <p:cNvPr id="33" name="TextBox 32">
+            <a:extLst>
+              <a:ext uri="{FF2B5EF4-FFF2-40B4-BE49-F238E27FC236}">
+                <a16:creationId xmlns:a16="http://schemas.microsoft.com/office/drawing/2014/main" id="{0288C9FB-42DB-B3D9-9934-919DA4E1047B}"/>
+              </a:ext>
+            </a:extLst>
+          </p:cNvPr>
+          <p:cNvSpPr txBox="1"/>
+          <p:nvPr/>
+        </p:nvSpPr>
+        <p:spPr>
+          <a:xfrm>
+            <a:off x="4531109" y="5343557"/>
+            <a:ext cx="2874505" cy="514051"/>
+          </a:xfrm>
+          <a:prstGeom prst="rect">
+            <a:avLst/>
+          </a:prstGeom>
+          <a:noFill/>
+        </p:spPr>
+        <p:txBody>
+          <a:bodyPr wrap="none" rtlCol="0">
+            <a:spAutoFit/>
+          </a:bodyPr>
+          <a:lstStyle/>
+          <a:p>
+            <a:pPr algn="ctr" defTabSz="914400">
+              <a:lnSpc>
+                <a:spcPct val="115000"/>
+              </a:lnSpc>
+              <a:spcBef>
+                <a:spcPts val="300"/>
+              </a:spcBef>
+            </a:pPr>
+            <a:r>
+              <a:rPr lang="en-US" sz="2600" b="1" spc="25" dirty="0">
+                <a:solidFill>
+                  <a:schemeClr val="bg1"/>
+                </a:solidFill>
+                <a:latin typeface="Open Sauce Light"/>
               </a:rPr>
-              <a:t> of the individual's condition</a:t>
-            </a:r>
-            <a:endParaRPr lang="en-US" sz="2800" dirty="0">
-              <a:solidFill>
-                <a:srgbClr val="002060"/>
-              </a:solidFill>
-              <a:latin typeface="Aharoni" panose="02010803020104030203" pitchFamily="2" charset="-79"/>
-              <a:cs typeface="Aharoni" panose="02010803020104030203" pitchFamily="2" charset="-79"/>
-            </a:endParaRPr>
+              <a:t>Blood Perfusion</a:t>
+            </a:r>
+          </a:p>
+        </p:txBody>
+      </p:sp>
+      <p:sp>
+        <p:nvSpPr>
+          <p:cNvPr id="34" name="TextBox 33">
+            <a:extLst>
+              <a:ext uri="{FF2B5EF4-FFF2-40B4-BE49-F238E27FC236}">
+                <a16:creationId xmlns:a16="http://schemas.microsoft.com/office/drawing/2014/main" id="{832E4A27-0D73-D83F-1393-D19C9956EFA1}"/>
+              </a:ext>
+            </a:extLst>
+          </p:cNvPr>
+          <p:cNvSpPr txBox="1"/>
+          <p:nvPr/>
+        </p:nvSpPr>
+        <p:spPr>
+          <a:xfrm>
+            <a:off x="9372600" y="5343557"/>
+            <a:ext cx="1183337" cy="514051"/>
+          </a:xfrm>
+          <a:prstGeom prst="rect">
+            <a:avLst/>
+          </a:prstGeom>
+          <a:noFill/>
+        </p:spPr>
+        <p:txBody>
+          <a:bodyPr wrap="none" rtlCol="0">
+            <a:spAutoFit/>
+          </a:bodyPr>
+          <a:lstStyle/>
+          <a:p>
+            <a:pPr algn="ctr" defTabSz="914400">
+              <a:lnSpc>
+                <a:spcPct val="115000"/>
+              </a:lnSpc>
+              <a:spcBef>
+                <a:spcPts val="300"/>
+              </a:spcBef>
+            </a:pPr>
+            <a:r>
+              <a:rPr lang="en-US" sz="2600" b="1" spc="25" dirty="0">
+                <a:solidFill>
+                  <a:schemeClr val="bg1"/>
+                </a:solidFill>
+                <a:latin typeface="Open Sauce Light"/>
+              </a:rPr>
+              <a:t>Facial</a:t>
+            </a:r>
           </a:p>
         </p:txBody>
       </p:sp>
     </p:spTree>
     <p:extLst>
       <p:ext uri="{BB962C8B-B14F-4D97-AF65-F5344CB8AC3E}">
-        <p14:creationId xmlns:p14="http://schemas.microsoft.com/office/powerpoint/2010/main" val="514256140"/>
+        <p14:creationId xmlns:p14="http://schemas.microsoft.com/office/powerpoint/2010/main" val="214992986"/>
       </p:ext>
     </p:extLst>
   </p:cSld>

</xml_diff>